<commit_message>
modify E and E slides
</commit_message>
<xml_diff>
--- a/Explore and Exploit/EandE.pptx
+++ b/Explore and Exploit/EandE.pptx
@@ -19,17 +19,23 @@
     <p:sldId id="275" r:id="rId13"/>
     <p:sldId id="276" r:id="rId14"/>
     <p:sldId id="266" r:id="rId15"/>
-    <p:sldId id="267" r:id="rId16"/>
-    <p:sldId id="277" r:id="rId17"/>
-    <p:sldId id="281" r:id="rId18"/>
-    <p:sldId id="278" r:id="rId19"/>
-    <p:sldId id="280" r:id="rId20"/>
-    <p:sldId id="268" r:id="rId21"/>
-    <p:sldId id="265" r:id="rId22"/>
-    <p:sldId id="269" r:id="rId23"/>
-    <p:sldId id="270" r:id="rId24"/>
-    <p:sldId id="272" r:id="rId25"/>
-    <p:sldId id="271" r:id="rId26"/>
+    <p:sldId id="287" r:id="rId16"/>
+    <p:sldId id="285" r:id="rId17"/>
+    <p:sldId id="286" r:id="rId18"/>
+    <p:sldId id="267" r:id="rId19"/>
+    <p:sldId id="277" r:id="rId20"/>
+    <p:sldId id="281" r:id="rId21"/>
+    <p:sldId id="278" r:id="rId22"/>
+    <p:sldId id="280" r:id="rId23"/>
+    <p:sldId id="268" r:id="rId24"/>
+    <p:sldId id="282" r:id="rId25"/>
+    <p:sldId id="283" r:id="rId26"/>
+    <p:sldId id="284" r:id="rId27"/>
+    <p:sldId id="265" r:id="rId28"/>
+    <p:sldId id="269" r:id="rId29"/>
+    <p:sldId id="270" r:id="rId30"/>
+    <p:sldId id="272" r:id="rId31"/>
+    <p:sldId id="271" r:id="rId32"/>
   </p:sldIdLst>
   <p:sldSz cx="12192000" cy="6858000"/>
   <p:notesSz cx="6858000" cy="9144000"/>
@@ -3018,10 +3024,22 @@
               <a:rPr lang="en-US" dirty="0" smtClean="0"/>
             </a:br>
             <a:r>
-              <a:rPr lang="en-US" sz="2800" dirty="0" smtClean="0"/>
-              <a:t> In Computational Advertising</a:t>
-            </a:r>
-            <a:endParaRPr lang="en-US" dirty="0"/>
+              <a:rPr lang="en-US" sz="3200" dirty="0" smtClean="0"/>
+              <a:t> </a:t>
+            </a:r>
+            <a:r>
+              <a:rPr lang="en-US" altLang="zh-CN" sz="3200" dirty="0" smtClean="0"/>
+              <a:t>i</a:t>
+            </a:r>
+            <a:r>
+              <a:rPr lang="en-US" sz="3200" dirty="0" smtClean="0"/>
+              <a:t>n </a:t>
+            </a:r>
+            <a:r>
+              <a:rPr lang="en-US" sz="3200" dirty="0" smtClean="0"/>
+              <a:t>Computational Advertising</a:t>
+            </a:r>
+            <a:endParaRPr lang="en-US" sz="6600" dirty="0"/>
           </a:p>
         </p:txBody>
       </p:sp>
@@ -3037,7 +3055,9 @@
         </p:nvSpPr>
         <p:spPr/>
         <p:txBody>
-          <a:bodyPr/>
+          <a:bodyPr>
+            <a:normAutofit/>
+          </a:bodyPr>
           <a:lstStyle/>
           <a:p>
             <a:endParaRPr lang="en-US" dirty="0" smtClean="0"/>
@@ -3688,6 +3708,36 @@
           </a:p>
         </p:txBody>
       </p:sp>
+      <p:pic>
+        <p:nvPicPr>
+          <p:cNvPr id="4" name="Picture 3"/>
+          <p:cNvPicPr>
+            <a:picLocks noChangeAspect="1"/>
+          </p:cNvPicPr>
+          <p:nvPr/>
+        </p:nvPicPr>
+        <p:blipFill>
+          <a:blip r:embed="rId2">
+            <a:extLst>
+              <a:ext uri="{28A0092B-C50C-407E-A947-70E740481C1C}">
+                <a14:useLocalDpi xmlns:a14="http://schemas.microsoft.com/office/drawing/2010/main" val="0"/>
+              </a:ext>
+            </a:extLst>
+          </a:blip>
+          <a:stretch>
+            <a:fillRect/>
+          </a:stretch>
+        </p:blipFill>
+        <p:spPr>
+          <a:xfrm>
+            <a:off x="1066800" y="2472593"/>
+            <a:ext cx="10058400" cy="3397703"/>
+          </a:xfrm>
+          <a:prstGeom prst="rect">
+            <a:avLst/>
+          </a:prstGeom>
+        </p:spPr>
+      </p:pic>
     </p:spTree>
     <p:extLst>
       <p:ext uri="{BB962C8B-B14F-4D97-AF65-F5344CB8AC3E}">
@@ -3702,6 +3752,495 @@
 </file>
 
 <file path=ppt/slides/slide15.xml><?xml version="1.0" encoding="utf-8"?>
+<p:sld xmlns:a="http://schemas.openxmlformats.org/drawingml/2006/main" xmlns:r="http://schemas.openxmlformats.org/officeDocument/2006/relationships" xmlns:p="http://schemas.openxmlformats.org/presentationml/2006/main">
+  <p:cSld>
+    <p:spTree>
+      <p:nvGrpSpPr>
+        <p:cNvPr id="1" name=""/>
+        <p:cNvGrpSpPr/>
+        <p:nvPr/>
+      </p:nvGrpSpPr>
+      <p:grpSpPr>
+        <a:xfrm>
+          <a:off x="0" y="0"/>
+          <a:ext cx="0" cy="0"/>
+          <a:chOff x="0" y="0"/>
+          <a:chExt cx="0" cy="0"/>
+        </a:xfrm>
+      </p:grpSpPr>
+      <p:sp>
+        <p:nvSpPr>
+          <p:cNvPr id="2" name="Title 1"/>
+          <p:cNvSpPr>
+            <a:spLocks noGrp="1"/>
+          </p:cNvSpPr>
+          <p:nvPr>
+            <p:ph type="title"/>
+          </p:nvPr>
+        </p:nvSpPr>
+        <p:spPr/>
+        <p:txBody>
+          <a:bodyPr/>
+          <a:lstStyle/>
+          <a:p>
+            <a:r>
+              <a:rPr lang="en-US" altLang="zh-CN" dirty="0"/>
+              <a:t>Main Approaches </a:t>
+            </a:r>
+            <a:r>
+              <a:rPr lang="mr-IN" altLang="zh-CN" dirty="0"/>
+              <a:t>–</a:t>
+            </a:r>
+            <a:r>
+              <a:rPr lang="en-US" altLang="zh-CN" dirty="0"/>
+              <a:t> UCB extension</a:t>
+            </a:r>
+            <a:endParaRPr lang="en-US" dirty="0"/>
+          </a:p>
+        </p:txBody>
+      </p:sp>
+      <p:sp>
+        <p:nvSpPr>
+          <p:cNvPr id="3" name="Content Placeholder 2"/>
+          <p:cNvSpPr>
+            <a:spLocks noGrp="1"/>
+          </p:cNvSpPr>
+          <p:nvPr>
+            <p:ph idx="1"/>
+          </p:nvPr>
+        </p:nvSpPr>
+        <p:spPr/>
+        <p:txBody>
+          <a:bodyPr>
+            <a:normAutofit fontScale="92500" lnSpcReduction="10000"/>
+          </a:bodyPr>
+          <a:lstStyle/>
+          <a:p>
+            <a:r>
+              <a:rPr lang="en-US" b="1" dirty="0"/>
+              <a:t>a</a:t>
+            </a:r>
+            <a:r>
+              <a:rPr lang="en-US" dirty="0"/>
+              <a:t>, Each simulation traverses the tree by selecting the edge with maximum action value </a:t>
+            </a:r>
+            <a:r>
+              <a:rPr lang="en-US" i="1" dirty="0"/>
+              <a:t>Q</a:t>
+            </a:r>
+            <a:r>
+              <a:rPr lang="en-US" dirty="0"/>
+              <a:t>, plus a bonus </a:t>
+            </a:r>
+            <a:r>
+              <a:rPr lang="en-US" i="1" dirty="0"/>
+              <a:t>u</a:t>
+            </a:r>
+            <a:r>
+              <a:rPr lang="en-US" dirty="0"/>
+              <a:t>(</a:t>
+            </a:r>
+            <a:r>
+              <a:rPr lang="en-US" i="1" dirty="0"/>
+              <a:t>P</a:t>
+            </a:r>
+            <a:r>
+              <a:rPr lang="en-US" dirty="0"/>
+              <a:t>) that depends on a stored prior probability </a:t>
+            </a:r>
+            <a:r>
+              <a:rPr lang="en-US" i="1" dirty="0"/>
+              <a:t>P </a:t>
+            </a:r>
+            <a:r>
+              <a:rPr lang="en-US" dirty="0"/>
+              <a:t>for that edge. </a:t>
+            </a:r>
+            <a:endParaRPr lang="en-US" dirty="0" smtClean="0"/>
+          </a:p>
+          <a:p>
+            <a:r>
+              <a:rPr lang="en-US" b="1" dirty="0" smtClean="0"/>
+              <a:t>b</a:t>
+            </a:r>
+            <a:r>
+              <a:rPr lang="en-US" dirty="0"/>
+              <a:t>, The leaf node may be expanded; the new node is processed once by the policy network </a:t>
+            </a:r>
+            <a:r>
+              <a:rPr lang="en-US" i="1" dirty="0" err="1"/>
+              <a:t>pσ</a:t>
+            </a:r>
+            <a:r>
+              <a:rPr lang="en-US" i="1" dirty="0"/>
+              <a:t> </a:t>
+            </a:r>
+            <a:r>
+              <a:rPr lang="en-US" dirty="0"/>
+              <a:t>and the output probabilities are stored as prior probabilities </a:t>
+            </a:r>
+            <a:r>
+              <a:rPr lang="en-US" i="1" dirty="0"/>
+              <a:t>P </a:t>
+            </a:r>
+            <a:r>
+              <a:rPr lang="en-US" dirty="0"/>
+              <a:t>for each action. </a:t>
+            </a:r>
+            <a:endParaRPr lang="en-US" dirty="0" smtClean="0"/>
+          </a:p>
+          <a:p>
+            <a:r>
+              <a:rPr lang="en-US" b="1" dirty="0" smtClean="0"/>
+              <a:t>c</a:t>
+            </a:r>
+            <a:r>
+              <a:rPr lang="en-US" dirty="0"/>
+              <a:t>, At the end of a simulation, the leaf </a:t>
+            </a:r>
+            <a:r>
+              <a:rPr lang="en-US" dirty="0" smtClean="0"/>
+              <a:t>node</a:t>
+            </a:r>
+            <a:r>
+              <a:rPr lang="en-US" dirty="0"/>
+              <a:t> is evaluated in two ways: using the value network </a:t>
+            </a:r>
+            <a:r>
+              <a:rPr lang="en-US" i="1" dirty="0" err="1"/>
+              <a:t>vθ</a:t>
+            </a:r>
+            <a:r>
+              <a:rPr lang="en-US" dirty="0"/>
+              <a:t>; and by running</a:t>
+            </a:r>
+            <a:br>
+              <a:rPr lang="en-US" dirty="0"/>
+            </a:br>
+            <a:r>
+              <a:rPr lang="en-US" dirty="0"/>
+              <a:t>a rollout to the end of the game with the fast rollout policy </a:t>
+            </a:r>
+            <a:r>
+              <a:rPr lang="en-US" i="1" dirty="0"/>
+              <a:t>pπ</a:t>
+            </a:r>
+            <a:r>
+              <a:rPr lang="en-US" dirty="0"/>
+              <a:t>, then computing the winner with function </a:t>
+            </a:r>
+            <a:r>
+              <a:rPr lang="en-US" i="1" dirty="0"/>
+              <a:t>r</a:t>
+            </a:r>
+            <a:r>
+              <a:rPr lang="en-US" dirty="0"/>
+              <a:t>. </a:t>
+            </a:r>
+            <a:endParaRPr lang="en-US" dirty="0" smtClean="0"/>
+          </a:p>
+          <a:p>
+            <a:r>
+              <a:rPr lang="en-US" b="1" dirty="0" smtClean="0"/>
+              <a:t>d</a:t>
+            </a:r>
+            <a:r>
+              <a:rPr lang="en-US" dirty="0"/>
+              <a:t>, Action values </a:t>
+            </a:r>
+            <a:r>
+              <a:rPr lang="en-US" i="1" dirty="0"/>
+              <a:t>Q </a:t>
+            </a:r>
+            <a:r>
+              <a:rPr lang="en-US" dirty="0"/>
+              <a:t>are updated to track the mean value of all evaluations </a:t>
+            </a:r>
+            <a:r>
+              <a:rPr lang="en-US" i="1" dirty="0"/>
+              <a:t>r</a:t>
+            </a:r>
+            <a:r>
+              <a:rPr lang="en-US" dirty="0"/>
+              <a:t>(·) and </a:t>
+            </a:r>
+            <a:r>
+              <a:rPr lang="en-US" i="1" dirty="0" err="1"/>
+              <a:t>vθ</a:t>
+            </a:r>
+            <a:r>
+              <a:rPr lang="en-US" dirty="0"/>
+              <a:t>(·) in the </a:t>
+            </a:r>
+            <a:r>
+              <a:rPr lang="en-US" dirty="0" err="1"/>
+              <a:t>subtree</a:t>
+            </a:r>
+            <a:r>
+              <a:rPr lang="en-US" dirty="0"/>
+              <a:t> below that action. </a:t>
+            </a:r>
+            <a:endParaRPr lang="en-US" dirty="0"/>
+          </a:p>
+          <a:p>
+            <a:endParaRPr lang="en-US" dirty="0"/>
+          </a:p>
+          <a:p>
+            <a:endParaRPr lang="en-US" dirty="0"/>
+          </a:p>
+        </p:txBody>
+      </p:sp>
+    </p:spTree>
+    <p:extLst>
+      <p:ext uri="{BB962C8B-B14F-4D97-AF65-F5344CB8AC3E}">
+        <p14:creationId xmlns:p14="http://schemas.microsoft.com/office/powerpoint/2010/main" val="2069731604"/>
+      </p:ext>
+    </p:extLst>
+  </p:cSld>
+  <p:clrMapOvr>
+    <a:masterClrMapping/>
+  </p:clrMapOvr>
+</p:sld>
+</file>
+
+<file path=ppt/slides/slide16.xml><?xml version="1.0" encoding="utf-8"?>
+<p:sld xmlns:a="http://schemas.openxmlformats.org/drawingml/2006/main" xmlns:r="http://schemas.openxmlformats.org/officeDocument/2006/relationships" xmlns:p="http://schemas.openxmlformats.org/presentationml/2006/main">
+  <p:cSld>
+    <p:spTree>
+      <p:nvGrpSpPr>
+        <p:cNvPr id="1" name=""/>
+        <p:cNvGrpSpPr/>
+        <p:nvPr/>
+      </p:nvGrpSpPr>
+      <p:grpSpPr>
+        <a:xfrm>
+          <a:off x="0" y="0"/>
+          <a:ext cx="0" cy="0"/>
+          <a:chOff x="0" y="0"/>
+          <a:chExt cx="0" cy="0"/>
+        </a:xfrm>
+      </p:grpSpPr>
+      <p:sp>
+        <p:nvSpPr>
+          <p:cNvPr id="2" name="Title 1"/>
+          <p:cNvSpPr>
+            <a:spLocks noGrp="1"/>
+          </p:cNvSpPr>
+          <p:nvPr>
+            <p:ph type="title"/>
+          </p:nvPr>
+        </p:nvSpPr>
+        <p:spPr/>
+        <p:txBody>
+          <a:bodyPr/>
+          <a:lstStyle/>
+          <a:p>
+            <a:r>
+              <a:rPr lang="en-US" altLang="zh-CN" dirty="0" smtClean="0"/>
+              <a:t>Main Approaches </a:t>
+            </a:r>
+            <a:r>
+              <a:rPr lang="mr-IN" altLang="zh-CN" dirty="0" smtClean="0"/>
+              <a:t>–</a:t>
+            </a:r>
+            <a:r>
+              <a:rPr lang="en-US" altLang="zh-CN" dirty="0" smtClean="0"/>
+              <a:t> UCB extension</a:t>
+            </a:r>
+            <a:endParaRPr lang="en-US" dirty="0"/>
+          </a:p>
+        </p:txBody>
+      </p:sp>
+      <p:sp>
+        <p:nvSpPr>
+          <p:cNvPr id="3" name="Content Placeholder 2"/>
+          <p:cNvSpPr>
+            <a:spLocks noGrp="1"/>
+          </p:cNvSpPr>
+          <p:nvPr>
+            <p:ph idx="1"/>
+          </p:nvPr>
+        </p:nvSpPr>
+        <p:spPr/>
+        <p:txBody>
+          <a:bodyPr/>
+          <a:lstStyle/>
+          <a:p>
+            <a:r>
+              <a:rPr lang="en-US" dirty="0" smtClean="0"/>
+              <a:t>UCT</a:t>
+            </a:r>
+          </a:p>
+          <a:p>
+            <a:pPr lvl="1"/>
+            <a:endParaRPr lang="en-US" dirty="0"/>
+          </a:p>
+        </p:txBody>
+      </p:sp>
+      <p:pic>
+        <p:nvPicPr>
+          <p:cNvPr id="4" name="Picture 3"/>
+          <p:cNvPicPr>
+            <a:picLocks noChangeAspect="1"/>
+          </p:cNvPicPr>
+          <p:nvPr/>
+        </p:nvPicPr>
+        <p:blipFill>
+          <a:blip r:embed="rId2">
+            <a:extLst>
+              <a:ext uri="{28A0092B-C50C-407E-A947-70E740481C1C}">
+                <a14:useLocalDpi xmlns:a14="http://schemas.microsoft.com/office/drawing/2010/main" val="0"/>
+              </a:ext>
+            </a:extLst>
+          </a:blip>
+          <a:stretch>
+            <a:fillRect/>
+          </a:stretch>
+        </p:blipFill>
+        <p:spPr>
+          <a:xfrm>
+            <a:off x="2085731" y="3649663"/>
+            <a:ext cx="5803900" cy="1054100"/>
+          </a:xfrm>
+          <a:prstGeom prst="rect">
+            <a:avLst/>
+          </a:prstGeom>
+        </p:spPr>
+      </p:pic>
+      <p:pic>
+        <p:nvPicPr>
+          <p:cNvPr id="5" name="Picture 4"/>
+          <p:cNvPicPr>
+            <a:picLocks noChangeAspect="1"/>
+          </p:cNvPicPr>
+          <p:nvPr/>
+        </p:nvPicPr>
+        <p:blipFill>
+          <a:blip r:embed="rId3">
+            <a:extLst>
+              <a:ext uri="{28A0092B-C50C-407E-A947-70E740481C1C}">
+                <a14:useLocalDpi xmlns:a14="http://schemas.microsoft.com/office/drawing/2010/main" val="0"/>
+              </a:ext>
+            </a:extLst>
+          </a:blip>
+          <a:stretch>
+            <a:fillRect/>
+          </a:stretch>
+        </p:blipFill>
+        <p:spPr>
+          <a:xfrm>
+            <a:off x="3410439" y="4703763"/>
+            <a:ext cx="3975100" cy="1473200"/>
+          </a:xfrm>
+          <a:prstGeom prst="rect">
+            <a:avLst/>
+          </a:prstGeom>
+        </p:spPr>
+      </p:pic>
+    </p:spTree>
+    <p:extLst>
+      <p:ext uri="{BB962C8B-B14F-4D97-AF65-F5344CB8AC3E}">
+        <p14:creationId xmlns:p14="http://schemas.microsoft.com/office/powerpoint/2010/main" val="1627882189"/>
+      </p:ext>
+    </p:extLst>
+  </p:cSld>
+  <p:clrMapOvr>
+    <a:masterClrMapping/>
+  </p:clrMapOvr>
+</p:sld>
+</file>
+
+<file path=ppt/slides/slide17.xml><?xml version="1.0" encoding="utf-8"?>
+<p:sld xmlns:a="http://schemas.openxmlformats.org/drawingml/2006/main" xmlns:r="http://schemas.openxmlformats.org/officeDocument/2006/relationships" xmlns:p="http://schemas.openxmlformats.org/presentationml/2006/main">
+  <p:cSld>
+    <p:spTree>
+      <p:nvGrpSpPr>
+        <p:cNvPr id="1" name=""/>
+        <p:cNvGrpSpPr/>
+        <p:nvPr/>
+      </p:nvGrpSpPr>
+      <p:grpSpPr>
+        <a:xfrm>
+          <a:off x="0" y="0"/>
+          <a:ext cx="0" cy="0"/>
+          <a:chOff x="0" y="0"/>
+          <a:chExt cx="0" cy="0"/>
+        </a:xfrm>
+      </p:grpSpPr>
+      <p:sp>
+        <p:nvSpPr>
+          <p:cNvPr id="2" name="Title 1"/>
+          <p:cNvSpPr>
+            <a:spLocks noGrp="1"/>
+          </p:cNvSpPr>
+          <p:nvPr>
+            <p:ph type="title"/>
+          </p:nvPr>
+        </p:nvSpPr>
+        <p:spPr/>
+        <p:txBody>
+          <a:bodyPr/>
+          <a:lstStyle/>
+          <a:p>
+            <a:r>
+              <a:rPr lang="en-US" altLang="zh-CN" dirty="0"/>
+              <a:t>Main Approaches </a:t>
+            </a:r>
+            <a:r>
+              <a:rPr lang="mr-IN" altLang="zh-CN" dirty="0"/>
+              <a:t>–</a:t>
+            </a:r>
+            <a:r>
+              <a:rPr lang="en-US" altLang="zh-CN" dirty="0"/>
+              <a:t> UCB extension</a:t>
+            </a:r>
+            <a:endParaRPr lang="en-US" dirty="0"/>
+          </a:p>
+        </p:txBody>
+      </p:sp>
+      <p:sp>
+        <p:nvSpPr>
+          <p:cNvPr id="3" name="Content Placeholder 2"/>
+          <p:cNvSpPr>
+            <a:spLocks noGrp="1"/>
+          </p:cNvSpPr>
+          <p:nvPr>
+            <p:ph idx="1"/>
+          </p:nvPr>
+        </p:nvSpPr>
+        <p:spPr/>
+        <p:txBody>
+          <a:bodyPr/>
+          <a:lstStyle/>
+          <a:p>
+            <a:r>
+              <a:rPr lang="en-US" dirty="0" smtClean="0"/>
+              <a:t>Hierarchical Advertising</a:t>
+            </a:r>
+          </a:p>
+          <a:p>
+            <a:r>
+              <a:rPr lang="en-US" dirty="0" smtClean="0"/>
+              <a:t>K is too large</a:t>
+            </a:r>
+            <a:endParaRPr lang="en-US" dirty="0"/>
+          </a:p>
+        </p:txBody>
+      </p:sp>
+    </p:spTree>
+    <p:extLst>
+      <p:ext uri="{BB962C8B-B14F-4D97-AF65-F5344CB8AC3E}">
+        <p14:creationId xmlns:p14="http://schemas.microsoft.com/office/powerpoint/2010/main" val="1769317292"/>
+      </p:ext>
+    </p:extLst>
+  </p:cSld>
+  <p:clrMapOvr>
+    <a:masterClrMapping/>
+  </p:clrMapOvr>
+</p:sld>
+</file>
+
+<file path=ppt/slides/slide18.xml><?xml version="1.0" encoding="utf-8"?>
 <p:sld xmlns:a="http://schemas.openxmlformats.org/drawingml/2006/main" xmlns:r="http://schemas.openxmlformats.org/officeDocument/2006/relationships" xmlns:p="http://schemas.openxmlformats.org/presentationml/2006/main">
   <p:cSld>
     <p:spTree>
@@ -3791,7 +4330,7 @@
 </p:sld>
 </file>
 
-<file path=ppt/slides/slide16.xml><?xml version="1.0" encoding="utf-8"?>
+<file path=ppt/slides/slide19.xml><?xml version="1.0" encoding="utf-8"?>
 <p:sld xmlns:a="http://schemas.openxmlformats.org/drawingml/2006/main" xmlns:r="http://schemas.openxmlformats.org/officeDocument/2006/relationships" xmlns:p="http://schemas.openxmlformats.org/presentationml/2006/main">
   <p:cSld>
     <p:spTree>
@@ -3882,7 +4421,7 @@
 </p:sld>
 </file>
 
-<file path=ppt/slides/slide17.xml><?xml version="1.0" encoding="utf-8"?>
+<file path=ppt/slides/slide2.xml><?xml version="1.0" encoding="utf-8"?>
 <p:sld xmlns:a="http://schemas.openxmlformats.org/drawingml/2006/main" xmlns:r="http://schemas.openxmlformats.org/officeDocument/2006/relationships" xmlns:p="http://schemas.openxmlformats.org/presentationml/2006/main">
   <p:cSld>
     <p:spTree>
@@ -3915,6 +4454,103 @@
           <a:lstStyle/>
           <a:p>
             <a:r>
+              <a:rPr lang="en-US" dirty="0" smtClean="0"/>
+              <a:t>Outline</a:t>
+            </a:r>
+            <a:endParaRPr lang="en-US" dirty="0"/>
+          </a:p>
+        </p:txBody>
+      </p:sp>
+      <p:sp>
+        <p:nvSpPr>
+          <p:cNvPr id="3" name="Content Placeholder 2"/>
+          <p:cNvSpPr>
+            <a:spLocks noGrp="1"/>
+          </p:cNvSpPr>
+          <p:nvPr>
+            <p:ph idx="1"/>
+          </p:nvPr>
+        </p:nvSpPr>
+        <p:spPr/>
+        <p:txBody>
+          <a:bodyPr>
+            <a:normAutofit/>
+          </a:bodyPr>
+          <a:lstStyle/>
+          <a:p>
+            <a:r>
+              <a:rPr lang="en-US" sz="3200" dirty="0" smtClean="0"/>
+              <a:t>What is E&amp;E?</a:t>
+            </a:r>
+          </a:p>
+          <a:p>
+            <a:r>
+              <a:rPr lang="en-US" sz="3200" dirty="0" smtClean="0"/>
+              <a:t>Main Approaches</a:t>
+            </a:r>
+          </a:p>
+          <a:p>
+            <a:r>
+              <a:rPr lang="en-US" sz="3200" dirty="0" smtClean="0"/>
+              <a:t>E&amp;E applications in computational advertising</a:t>
+            </a:r>
+            <a:endParaRPr lang="zh-CN" altLang="en-US" sz="3200" dirty="0" smtClean="0"/>
+          </a:p>
+          <a:p>
+            <a:r>
+              <a:rPr lang="en-US" altLang="zh-CN" sz="3200" dirty="0" smtClean="0"/>
+              <a:t>Summary</a:t>
+            </a:r>
+            <a:endParaRPr lang="en-US" sz="3200" dirty="0"/>
+          </a:p>
+        </p:txBody>
+      </p:sp>
+    </p:spTree>
+    <p:extLst>
+      <p:ext uri="{BB962C8B-B14F-4D97-AF65-F5344CB8AC3E}">
+        <p14:creationId xmlns:p14="http://schemas.microsoft.com/office/powerpoint/2010/main" val="2037873948"/>
+      </p:ext>
+    </p:extLst>
+  </p:cSld>
+  <p:clrMapOvr>
+    <a:masterClrMapping/>
+  </p:clrMapOvr>
+</p:sld>
+</file>
+
+<file path=ppt/slides/slide20.xml><?xml version="1.0" encoding="utf-8"?>
+<p:sld xmlns:a="http://schemas.openxmlformats.org/drawingml/2006/main" xmlns:r="http://schemas.openxmlformats.org/officeDocument/2006/relationships" xmlns:p="http://schemas.openxmlformats.org/presentationml/2006/main">
+  <p:cSld>
+    <p:spTree>
+      <p:nvGrpSpPr>
+        <p:cNvPr id="1" name=""/>
+        <p:cNvGrpSpPr/>
+        <p:nvPr/>
+      </p:nvGrpSpPr>
+      <p:grpSpPr>
+        <a:xfrm>
+          <a:off x="0" y="0"/>
+          <a:ext cx="0" cy="0"/>
+          <a:chOff x="0" y="0"/>
+          <a:chExt cx="0" cy="0"/>
+        </a:xfrm>
+      </p:grpSpPr>
+      <p:sp>
+        <p:nvSpPr>
+          <p:cNvPr id="2" name="Title 1"/>
+          <p:cNvSpPr>
+            <a:spLocks noGrp="1"/>
+          </p:cNvSpPr>
+          <p:nvPr>
+            <p:ph type="title"/>
+          </p:nvPr>
+        </p:nvSpPr>
+        <p:spPr/>
+        <p:txBody>
+          <a:bodyPr/>
+          <a:lstStyle/>
+          <a:p>
+            <a:r>
               <a:rPr lang="en-US" altLang="zh-CN" dirty="0"/>
               <a:t>Main Approaches </a:t>
             </a:r>
@@ -3972,7 +4608,7 @@
 </p:sld>
 </file>
 
-<file path=ppt/slides/slide18.xml><?xml version="1.0" encoding="utf-8"?>
+<file path=ppt/slides/slide21.xml><?xml version="1.0" encoding="utf-8"?>
 <p:sld xmlns:a="http://schemas.openxmlformats.org/drawingml/2006/main" xmlns:r="http://schemas.openxmlformats.org/officeDocument/2006/relationships" xmlns:p="http://schemas.openxmlformats.org/presentationml/2006/main">
   <p:cSld>
     <p:spTree>
@@ -4075,7 +4711,7 @@
 </p:sld>
 </file>
 
-<file path=ppt/slides/slide19.xml><?xml version="1.0" encoding="utf-8"?>
+<file path=ppt/slides/slide22.xml><?xml version="1.0" encoding="utf-8"?>
 <p:sld xmlns:a="http://schemas.openxmlformats.org/drawingml/2006/main" xmlns:r="http://schemas.openxmlformats.org/officeDocument/2006/relationships" xmlns:p="http://schemas.openxmlformats.org/presentationml/2006/main">
   <p:cSld>
     <p:spTree>
@@ -4170,514 +4806,6 @@
 </p:sld>
 </file>
 
-<file path=ppt/slides/slide2.xml><?xml version="1.0" encoding="utf-8"?>
-<p:sld xmlns:a="http://schemas.openxmlformats.org/drawingml/2006/main" xmlns:r="http://schemas.openxmlformats.org/officeDocument/2006/relationships" xmlns:p="http://schemas.openxmlformats.org/presentationml/2006/main">
-  <p:cSld>
-    <p:spTree>
-      <p:nvGrpSpPr>
-        <p:cNvPr id="1" name=""/>
-        <p:cNvGrpSpPr/>
-        <p:nvPr/>
-      </p:nvGrpSpPr>
-      <p:grpSpPr>
-        <a:xfrm>
-          <a:off x="0" y="0"/>
-          <a:ext cx="0" cy="0"/>
-          <a:chOff x="0" y="0"/>
-          <a:chExt cx="0" cy="0"/>
-        </a:xfrm>
-      </p:grpSpPr>
-      <p:sp>
-        <p:nvSpPr>
-          <p:cNvPr id="2" name="Title 1"/>
-          <p:cNvSpPr>
-            <a:spLocks noGrp="1"/>
-          </p:cNvSpPr>
-          <p:nvPr>
-            <p:ph type="title"/>
-          </p:nvPr>
-        </p:nvSpPr>
-        <p:spPr/>
-        <p:txBody>
-          <a:bodyPr/>
-          <a:lstStyle/>
-          <a:p>
-            <a:r>
-              <a:rPr lang="en-US" dirty="0" smtClean="0"/>
-              <a:t>Outline</a:t>
-            </a:r>
-            <a:endParaRPr lang="en-US" dirty="0"/>
-          </a:p>
-        </p:txBody>
-      </p:sp>
-      <p:sp>
-        <p:nvSpPr>
-          <p:cNvPr id="3" name="Content Placeholder 2"/>
-          <p:cNvSpPr>
-            <a:spLocks noGrp="1"/>
-          </p:cNvSpPr>
-          <p:nvPr>
-            <p:ph idx="1"/>
-          </p:nvPr>
-        </p:nvSpPr>
-        <p:spPr/>
-        <p:txBody>
-          <a:bodyPr/>
-          <a:lstStyle/>
-          <a:p>
-            <a:r>
-              <a:rPr lang="en-US" dirty="0" smtClean="0"/>
-              <a:t>What is E&amp;E?</a:t>
-            </a:r>
-          </a:p>
-          <a:p>
-            <a:r>
-              <a:rPr lang="en-US" dirty="0" smtClean="0"/>
-              <a:t>Main Approaches</a:t>
-            </a:r>
-          </a:p>
-          <a:p>
-            <a:r>
-              <a:rPr lang="en-US" dirty="0" smtClean="0"/>
-              <a:t>E&amp;E applications in computational advertising</a:t>
-            </a:r>
-            <a:endParaRPr lang="zh-CN" altLang="en-US" dirty="0" smtClean="0"/>
-          </a:p>
-          <a:p>
-            <a:r>
-              <a:rPr lang="en-US" altLang="zh-CN" dirty="0" smtClean="0"/>
-              <a:t>Summary</a:t>
-            </a:r>
-            <a:endParaRPr lang="en-US" dirty="0"/>
-          </a:p>
-        </p:txBody>
-      </p:sp>
-    </p:spTree>
-    <p:extLst>
-      <p:ext uri="{BB962C8B-B14F-4D97-AF65-F5344CB8AC3E}">
-        <p14:creationId xmlns:p14="http://schemas.microsoft.com/office/powerpoint/2010/main" val="2037873948"/>
-      </p:ext>
-    </p:extLst>
-  </p:cSld>
-  <p:clrMapOvr>
-    <a:masterClrMapping/>
-  </p:clrMapOvr>
-</p:sld>
-</file>
-
-<file path=ppt/slides/slide20.xml><?xml version="1.0" encoding="utf-8"?>
-<p:sld xmlns:a="http://schemas.openxmlformats.org/drawingml/2006/main" xmlns:r="http://schemas.openxmlformats.org/officeDocument/2006/relationships" xmlns:p="http://schemas.openxmlformats.org/presentationml/2006/main">
-  <p:cSld>
-    <p:spTree>
-      <p:nvGrpSpPr>
-        <p:cNvPr id="1" name=""/>
-        <p:cNvGrpSpPr/>
-        <p:nvPr/>
-      </p:nvGrpSpPr>
-      <p:grpSpPr>
-        <a:xfrm>
-          <a:off x="0" y="0"/>
-          <a:ext cx="0" cy="0"/>
-          <a:chOff x="0" y="0"/>
-          <a:chExt cx="0" cy="0"/>
-        </a:xfrm>
-      </p:grpSpPr>
-      <p:sp>
-        <p:nvSpPr>
-          <p:cNvPr id="2" name="Title 1"/>
-          <p:cNvSpPr>
-            <a:spLocks noGrp="1"/>
-          </p:cNvSpPr>
-          <p:nvPr>
-            <p:ph type="title"/>
-          </p:nvPr>
-        </p:nvSpPr>
-        <p:spPr/>
-        <p:txBody>
-          <a:bodyPr/>
-          <a:lstStyle/>
-          <a:p>
-            <a:r>
-              <a:rPr lang="en-US" altLang="zh-CN" dirty="0" smtClean="0"/>
-              <a:t>Main Approaches </a:t>
-            </a:r>
-            <a:r>
-              <a:rPr lang="mr-IN" altLang="zh-CN" dirty="0" smtClean="0"/>
-              <a:t>–</a:t>
-            </a:r>
-            <a:r>
-              <a:rPr lang="en-US" altLang="zh-CN" dirty="0" smtClean="0"/>
-              <a:t> Contextual-Bandit Approach</a:t>
-            </a:r>
-            <a:endParaRPr lang="en-US" dirty="0"/>
-          </a:p>
-        </p:txBody>
-      </p:sp>
-      <p:sp>
-        <p:nvSpPr>
-          <p:cNvPr id="3" name="Content Placeholder 2"/>
-          <p:cNvSpPr>
-            <a:spLocks noGrp="1"/>
-          </p:cNvSpPr>
-          <p:nvPr>
-            <p:ph idx="1"/>
-          </p:nvPr>
-        </p:nvSpPr>
-        <p:spPr/>
-        <p:txBody>
-          <a:bodyPr/>
-          <a:lstStyle/>
-          <a:p>
-            <a:r>
-              <a:rPr lang="en-US" dirty="0"/>
-              <a:t>How to integrate </a:t>
-            </a:r>
-            <a:r>
-              <a:rPr lang="en-US" dirty="0" smtClean="0"/>
-              <a:t>Explore </a:t>
-            </a:r>
-            <a:r>
-              <a:rPr lang="en-US" dirty="0"/>
-              <a:t>and </a:t>
-            </a:r>
-            <a:r>
-              <a:rPr lang="en-US" dirty="0" smtClean="0"/>
-              <a:t>Exploit </a:t>
-            </a:r>
-            <a:r>
-              <a:rPr lang="en-US" dirty="0"/>
-              <a:t>with contextual model</a:t>
-            </a:r>
-            <a:r>
-              <a:rPr lang="en-US" dirty="0" smtClean="0"/>
-              <a:t>?</a:t>
-            </a:r>
-            <a:endParaRPr lang="en-US" dirty="0" smtClean="0"/>
-          </a:p>
-          <a:p>
-            <a:pPr lvl="1"/>
-            <a:r>
-              <a:rPr lang="en-US" dirty="0" smtClean="0"/>
-              <a:t>Content</a:t>
-            </a:r>
-          </a:p>
-          <a:p>
-            <a:pPr lvl="1"/>
-            <a:r>
-              <a:rPr lang="en-US" dirty="0" err="1" smtClean="0"/>
-              <a:t>Lables</a:t>
-            </a:r>
-            <a:r>
-              <a:rPr lang="en-US" dirty="0" smtClean="0"/>
-              <a:t> / Attributes</a:t>
-            </a:r>
-          </a:p>
-          <a:p>
-            <a:pPr lvl="1"/>
-            <a:r>
-              <a:rPr lang="en-US" altLang="zh-CN" dirty="0" smtClean="0"/>
-              <a:t>D</a:t>
-            </a:r>
-            <a:r>
-              <a:rPr lang="en-US" dirty="0" smtClean="0"/>
-              <a:t>emographic</a:t>
-            </a:r>
-            <a:endParaRPr lang="zh-CN" altLang="en-US" dirty="0" smtClean="0"/>
-          </a:p>
-          <a:p>
-            <a:pPr lvl="1"/>
-            <a:r>
-              <a:rPr lang="en-US" altLang="zh-CN" dirty="0" smtClean="0"/>
-              <a:t>User</a:t>
-            </a:r>
-            <a:r>
-              <a:rPr lang="zh-CN" altLang="en-US" dirty="0" smtClean="0"/>
-              <a:t> </a:t>
-            </a:r>
-            <a:r>
-              <a:rPr lang="en-US" altLang="zh-CN" dirty="0" smtClean="0"/>
-              <a:t>Historical</a:t>
-            </a:r>
-            <a:r>
-              <a:rPr lang="zh-CN" altLang="en-US" dirty="0" smtClean="0"/>
-              <a:t> </a:t>
-            </a:r>
-            <a:r>
-              <a:rPr lang="en-US" altLang="zh-CN" dirty="0" smtClean="0"/>
-              <a:t>Behavior</a:t>
-            </a:r>
-            <a:endParaRPr lang="en-US" dirty="0"/>
-          </a:p>
-          <a:p>
-            <a:pPr lvl="1"/>
-            <a:r>
-              <a:rPr lang="en-US" smtClean="0"/>
-              <a:t>Etc.</a:t>
-            </a:r>
-            <a:endParaRPr lang="en-US" dirty="0"/>
-          </a:p>
-        </p:txBody>
-      </p:sp>
-    </p:spTree>
-    <p:extLst>
-      <p:ext uri="{BB962C8B-B14F-4D97-AF65-F5344CB8AC3E}">
-        <p14:creationId xmlns:p14="http://schemas.microsoft.com/office/powerpoint/2010/main" val="1589256668"/>
-      </p:ext>
-    </p:extLst>
-  </p:cSld>
-  <p:clrMapOvr>
-    <a:masterClrMapping/>
-  </p:clrMapOvr>
-</p:sld>
-</file>
-
-<file path=ppt/slides/slide21.xml><?xml version="1.0" encoding="utf-8"?>
-<p:sld xmlns:a="http://schemas.openxmlformats.org/drawingml/2006/main" xmlns:r="http://schemas.openxmlformats.org/officeDocument/2006/relationships" xmlns:p="http://schemas.openxmlformats.org/presentationml/2006/main">
-  <p:cSld>
-    <p:spTree>
-      <p:nvGrpSpPr>
-        <p:cNvPr id="1" name=""/>
-        <p:cNvGrpSpPr/>
-        <p:nvPr/>
-      </p:nvGrpSpPr>
-      <p:grpSpPr>
-        <a:xfrm>
-          <a:off x="0" y="0"/>
-          <a:ext cx="0" cy="0"/>
-          <a:chOff x="0" y="0"/>
-          <a:chExt cx="0" cy="0"/>
-        </a:xfrm>
-      </p:grpSpPr>
-      <p:sp>
-        <p:nvSpPr>
-          <p:cNvPr id="2" name="Title 1"/>
-          <p:cNvSpPr>
-            <a:spLocks noGrp="1"/>
-          </p:cNvSpPr>
-          <p:nvPr>
-            <p:ph type="title"/>
-          </p:nvPr>
-        </p:nvSpPr>
-        <p:spPr/>
-        <p:txBody>
-          <a:bodyPr>
-            <a:normAutofit/>
-          </a:bodyPr>
-          <a:lstStyle/>
-          <a:p>
-            <a:r>
-              <a:rPr lang="en-US" dirty="0" smtClean="0"/>
-              <a:t>E&amp;E Applications - </a:t>
-            </a:r>
-            <a:r>
-              <a:rPr lang="en-US" dirty="0"/>
-              <a:t>Programmatic </a:t>
-            </a:r>
-            <a:r>
-              <a:rPr lang="en-US" dirty="0" smtClean="0"/>
-              <a:t>Creative Optimization </a:t>
-            </a:r>
-            <a:endParaRPr lang="en-US" dirty="0"/>
-          </a:p>
-        </p:txBody>
-      </p:sp>
-      <p:sp>
-        <p:nvSpPr>
-          <p:cNvPr id="5" name="TextBox 4"/>
-          <p:cNvSpPr txBox="1"/>
-          <p:nvPr/>
-        </p:nvSpPr>
-        <p:spPr>
-          <a:xfrm>
-            <a:off x="1031631" y="2098430"/>
-            <a:ext cx="10322169" cy="923330"/>
-          </a:xfrm>
-          <a:prstGeom prst="rect">
-            <a:avLst/>
-          </a:prstGeom>
-          <a:noFill/>
-        </p:spPr>
-        <p:txBody>
-          <a:bodyPr wrap="square" rtlCol="0">
-            <a:spAutoFit/>
-          </a:bodyPr>
-          <a:lstStyle/>
-          <a:p>
-            <a:r>
-              <a:rPr lang="zh-CN" altLang="en-US" dirty="0" smtClean="0"/>
-              <a:t>做</a:t>
-            </a:r>
-            <a:r>
-              <a:rPr lang="en-US" altLang="zh-CN" dirty="0" smtClean="0"/>
-              <a:t>UBER</a:t>
-            </a:r>
-            <a:r>
-              <a:rPr lang="zh-CN" altLang="en-US" dirty="0" smtClean="0"/>
-              <a:t>司机，月入万元			</a:t>
-            </a:r>
-            <a:r>
-              <a:rPr lang="en-US" altLang="zh-CN" dirty="0" smtClean="0"/>
-              <a:t>CVR=0.1%</a:t>
-            </a:r>
-            <a:endParaRPr lang="zh-CN" altLang="en-US" dirty="0" smtClean="0"/>
-          </a:p>
-          <a:p>
-            <a:endParaRPr lang="zh-CN" altLang="en-US" dirty="0" smtClean="0"/>
-          </a:p>
-          <a:p>
-            <a:r>
-              <a:rPr lang="zh-CN" altLang="en-US" dirty="0" smtClean="0"/>
-              <a:t>在北京做</a:t>
-            </a:r>
-            <a:r>
-              <a:rPr lang="en-US" altLang="zh-CN" dirty="0" smtClean="0"/>
-              <a:t>UBER</a:t>
-            </a:r>
-            <a:r>
-              <a:rPr lang="zh-CN" altLang="en-US" dirty="0" smtClean="0"/>
-              <a:t>司机，月入万元		</a:t>
-            </a:r>
-            <a:r>
-              <a:rPr lang="en-US" altLang="zh-CN" dirty="0" smtClean="0"/>
-              <a:t>CVR</a:t>
-            </a:r>
-            <a:r>
-              <a:rPr lang="zh-CN" altLang="en-US" dirty="0"/>
-              <a:t> </a:t>
-            </a:r>
-            <a:r>
-              <a:rPr lang="en-US" altLang="zh-CN" dirty="0" smtClean="0"/>
-              <a:t>lift</a:t>
-            </a:r>
-            <a:r>
-              <a:rPr lang="zh-CN" altLang="en-US" dirty="0" smtClean="0"/>
-              <a:t> </a:t>
-            </a:r>
-            <a:r>
-              <a:rPr lang="en-US" altLang="zh-CN" dirty="0" smtClean="0"/>
-              <a:t>40%</a:t>
-            </a:r>
-            <a:endParaRPr lang="en-US" dirty="0"/>
-          </a:p>
-        </p:txBody>
-      </p:sp>
-    </p:spTree>
-    <p:extLst>
-      <p:ext uri="{BB962C8B-B14F-4D97-AF65-F5344CB8AC3E}">
-        <p14:creationId xmlns:p14="http://schemas.microsoft.com/office/powerpoint/2010/main" val="217670522"/>
-      </p:ext>
-    </p:extLst>
-  </p:cSld>
-  <p:clrMapOvr>
-    <a:masterClrMapping/>
-  </p:clrMapOvr>
-</p:sld>
-</file>
-
-<file path=ppt/slides/slide22.xml><?xml version="1.0" encoding="utf-8"?>
-<p:sld xmlns:a="http://schemas.openxmlformats.org/drawingml/2006/main" xmlns:r="http://schemas.openxmlformats.org/officeDocument/2006/relationships" xmlns:p="http://schemas.openxmlformats.org/presentationml/2006/main">
-  <p:cSld>
-    <p:spTree>
-      <p:nvGrpSpPr>
-        <p:cNvPr id="1" name=""/>
-        <p:cNvGrpSpPr/>
-        <p:nvPr/>
-      </p:nvGrpSpPr>
-      <p:grpSpPr>
-        <a:xfrm>
-          <a:off x="0" y="0"/>
-          <a:ext cx="0" cy="0"/>
-          <a:chOff x="0" y="0"/>
-          <a:chExt cx="0" cy="0"/>
-        </a:xfrm>
-      </p:grpSpPr>
-      <p:sp>
-        <p:nvSpPr>
-          <p:cNvPr id="2" name="Title 1"/>
-          <p:cNvSpPr>
-            <a:spLocks noGrp="1"/>
-          </p:cNvSpPr>
-          <p:nvPr>
-            <p:ph type="title"/>
-          </p:nvPr>
-        </p:nvSpPr>
-        <p:spPr/>
-        <p:txBody>
-          <a:bodyPr/>
-          <a:lstStyle/>
-          <a:p>
-            <a:r>
-              <a:rPr lang="en-US" dirty="0" smtClean="0"/>
-              <a:t>E&amp;E Applications </a:t>
-            </a:r>
-            <a:r>
-              <a:rPr lang="mr-IN" dirty="0" smtClean="0"/>
-              <a:t>–</a:t>
-            </a:r>
-            <a:r>
-              <a:rPr lang="zh-CN" altLang="en-US" dirty="0" smtClean="0"/>
-              <a:t> </a:t>
-            </a:r>
-            <a:r>
-              <a:rPr lang="en-US" altLang="zh-CN" dirty="0" smtClean="0"/>
-              <a:t>Auction</a:t>
-            </a:r>
-            <a:r>
-              <a:rPr lang="zh-CN" altLang="en-US" dirty="0" smtClean="0"/>
-              <a:t> </a:t>
-            </a:r>
-            <a:r>
-              <a:rPr lang="en-US" altLang="zh-CN" dirty="0" smtClean="0"/>
-              <a:t>Traffic</a:t>
-            </a:r>
-            <a:r>
-              <a:rPr lang="zh-CN" altLang="en-US" dirty="0" smtClean="0"/>
-              <a:t> </a:t>
-            </a:r>
-            <a:r>
-              <a:rPr lang="en-US" altLang="zh-CN" dirty="0" smtClean="0"/>
-              <a:t>Allocation</a:t>
-            </a:r>
-            <a:endParaRPr lang="en-US" dirty="0"/>
-          </a:p>
-        </p:txBody>
-      </p:sp>
-      <p:sp>
-        <p:nvSpPr>
-          <p:cNvPr id="3" name="Content Placeholder 2"/>
-          <p:cNvSpPr>
-            <a:spLocks noGrp="1"/>
-          </p:cNvSpPr>
-          <p:nvPr>
-            <p:ph idx="1"/>
-          </p:nvPr>
-        </p:nvSpPr>
-        <p:spPr/>
-        <p:txBody>
-          <a:bodyPr/>
-          <a:lstStyle/>
-          <a:p>
-            <a:r>
-              <a:rPr lang="en-US" dirty="0" smtClean="0"/>
-              <a:t>How to allocate traffic with specific tags to SSP?</a:t>
-            </a:r>
-            <a:endParaRPr lang="en-US" dirty="0"/>
-          </a:p>
-        </p:txBody>
-      </p:sp>
-    </p:spTree>
-    <p:extLst>
-      <p:ext uri="{BB962C8B-B14F-4D97-AF65-F5344CB8AC3E}">
-        <p14:creationId xmlns:p14="http://schemas.microsoft.com/office/powerpoint/2010/main" val="1719442406"/>
-      </p:ext>
-    </p:extLst>
-  </p:cSld>
-  <p:clrMapOvr>
-    <a:masterClrMapping/>
-  </p:clrMapOvr>
-</p:sld>
-</file>
-
 <file path=ppt/slides/slide23.xml><?xml version="1.0" encoding="utf-8"?>
 <p:sld xmlns:a="http://schemas.openxmlformats.org/drawingml/2006/main" xmlns:r="http://schemas.openxmlformats.org/officeDocument/2006/relationships" xmlns:p="http://schemas.openxmlformats.org/presentationml/2006/main">
   <p:cSld>
@@ -4711,12 +4839,97 @@
           <a:lstStyle/>
           <a:p>
             <a:r>
+              <a:rPr lang="en-US" altLang="zh-CN" dirty="0" smtClean="0"/>
+              <a:t>Main Approaches </a:t>
+            </a:r>
+            <a:r>
+              <a:rPr lang="mr-IN" altLang="zh-CN" dirty="0" smtClean="0"/>
+              <a:t>–</a:t>
+            </a:r>
+            <a:r>
+              <a:rPr lang="en-US" altLang="zh-CN" dirty="0" smtClean="0"/>
+              <a:t> Contextual-Bandit Approach</a:t>
+            </a:r>
+            <a:endParaRPr lang="en-US" dirty="0"/>
+          </a:p>
+        </p:txBody>
+      </p:sp>
+      <p:sp>
+        <p:nvSpPr>
+          <p:cNvPr id="3" name="Content Placeholder 2"/>
+          <p:cNvSpPr>
+            <a:spLocks noGrp="1"/>
+          </p:cNvSpPr>
+          <p:nvPr>
+            <p:ph idx="1"/>
+          </p:nvPr>
+        </p:nvSpPr>
+        <p:spPr/>
+        <p:txBody>
+          <a:bodyPr/>
+          <a:lstStyle/>
+          <a:p>
+            <a:r>
+              <a:rPr lang="en-US" dirty="0"/>
+              <a:t>How to integrate </a:t>
+            </a:r>
+            <a:r>
               <a:rPr lang="en-US" dirty="0" smtClean="0"/>
-              <a:t>E&amp;E Applications </a:t>
-            </a:r>
-            <a:r>
-              <a:rPr lang="mr-IN" dirty="0" smtClean="0"/>
-              <a:t>–</a:t>
+              <a:t>Explore </a:t>
+            </a:r>
+            <a:r>
+              <a:rPr lang="en-US" dirty="0"/>
+              <a:t>and </a:t>
+            </a:r>
+            <a:r>
+              <a:rPr lang="en-US" dirty="0" smtClean="0"/>
+              <a:t>Exploit </a:t>
+            </a:r>
+            <a:r>
+              <a:rPr lang="en-US" dirty="0"/>
+              <a:t>with contextual model</a:t>
+            </a:r>
+            <a:r>
+              <a:rPr lang="en-US" dirty="0" smtClean="0"/>
+              <a:t>?</a:t>
+            </a:r>
+            <a:endParaRPr lang="en-US" dirty="0" smtClean="0"/>
+          </a:p>
+          <a:p>
+            <a:pPr lvl="1"/>
+            <a:r>
+              <a:rPr lang="en-US" dirty="0" smtClean="0"/>
+              <a:t>Content</a:t>
+            </a:r>
+          </a:p>
+          <a:p>
+            <a:pPr lvl="1"/>
+            <a:r>
+              <a:rPr lang="en-US" dirty="0" err="1" smtClean="0"/>
+              <a:t>Lables</a:t>
+            </a:r>
+            <a:r>
+              <a:rPr lang="en-US" dirty="0" smtClean="0"/>
+              <a:t> / Attributes</a:t>
+            </a:r>
+          </a:p>
+          <a:p>
+            <a:pPr lvl="1"/>
+            <a:r>
+              <a:rPr lang="en-US" altLang="zh-CN" dirty="0" smtClean="0"/>
+              <a:t>D</a:t>
+            </a:r>
+            <a:r>
+              <a:rPr lang="en-US" dirty="0" smtClean="0"/>
+              <a:t>emographic</a:t>
+            </a:r>
+            <a:endParaRPr lang="zh-CN" altLang="en-US" dirty="0" smtClean="0"/>
+          </a:p>
+          <a:p>
+            <a:pPr lvl="1"/>
+            <a:r>
+              <a:rPr lang="en-US" altLang="zh-CN" dirty="0" smtClean="0"/>
+              <a:t>User</a:t>
             </a:r>
             <a:r>
               <a:rPr lang="zh-CN" altLang="en-US" dirty="0" smtClean="0"/>
@@ -4724,7 +4937,7 @@
             </a:r>
             <a:r>
               <a:rPr lang="en-US" altLang="zh-CN" dirty="0" smtClean="0"/>
-              <a:t>CVR</a:t>
+              <a:t>Historical</a:t>
             </a:r>
             <a:r>
               <a:rPr lang="zh-CN" altLang="en-US" dirty="0" smtClean="0"/>
@@ -4732,27 +4945,16 @@
             </a:r>
             <a:r>
               <a:rPr lang="en-US" altLang="zh-CN" dirty="0" smtClean="0"/>
-              <a:t>Exploration</a:t>
+              <a:t>Behavior</a:t>
             </a:r>
             <a:endParaRPr lang="en-US" dirty="0"/>
           </a:p>
-        </p:txBody>
-      </p:sp>
-      <p:sp>
-        <p:nvSpPr>
-          <p:cNvPr id="3" name="Content Placeholder 2"/>
-          <p:cNvSpPr>
-            <a:spLocks noGrp="1"/>
-          </p:cNvSpPr>
-          <p:nvPr>
-            <p:ph idx="1"/>
-          </p:nvPr>
-        </p:nvSpPr>
-        <p:spPr/>
-        <p:txBody>
-          <a:bodyPr/>
-          <a:lstStyle/>
-          <a:p>
+          <a:p>
+            <a:pPr lvl="1"/>
+            <a:r>
+              <a:rPr lang="en-US" dirty="0" smtClean="0"/>
+              <a:t>Etc.</a:t>
+            </a:r>
             <a:endParaRPr lang="en-US" dirty="0"/>
           </a:p>
         </p:txBody>
@@ -4760,7 +4962,7 @@
     </p:spTree>
     <p:extLst>
       <p:ext uri="{BB962C8B-B14F-4D97-AF65-F5344CB8AC3E}">
-        <p14:creationId xmlns:p14="http://schemas.microsoft.com/office/powerpoint/2010/main" val="400404139"/>
+        <p14:creationId xmlns:p14="http://schemas.microsoft.com/office/powerpoint/2010/main" val="1589256668"/>
       </p:ext>
     </p:extLst>
   </p:cSld>
@@ -4804,84 +5006,54 @@
           <a:p>
             <a:r>
               <a:rPr lang="en-US" altLang="zh-CN" dirty="0" smtClean="0"/>
-              <a:t>Summary</a:t>
+              <a:t>Main Approaches </a:t>
+            </a:r>
+            <a:r>
+              <a:rPr lang="mr-IN" altLang="zh-CN" dirty="0" smtClean="0"/>
+              <a:t>–</a:t>
+            </a:r>
+            <a:r>
+              <a:rPr lang="en-US" altLang="zh-CN" dirty="0" smtClean="0"/>
+              <a:t> Contextual-Bandit Approach</a:t>
             </a:r>
             <a:endParaRPr lang="en-US" dirty="0"/>
           </a:p>
         </p:txBody>
       </p:sp>
-      <p:sp>
-        <p:nvSpPr>
-          <p:cNvPr id="3" name="Content Placeholder 2"/>
-          <p:cNvSpPr>
-            <a:spLocks noGrp="1"/>
-          </p:cNvSpPr>
-          <p:nvPr>
-            <p:ph idx="1"/>
-          </p:nvPr>
-        </p:nvSpPr>
-        <p:spPr/>
-        <p:txBody>
-          <a:bodyPr/>
-          <a:lstStyle/>
-          <a:p>
-            <a:r>
-              <a:rPr lang="en-US" dirty="0" smtClean="0"/>
-              <a:t>Exploitation and Exploration Tradeoff</a:t>
-            </a:r>
-          </a:p>
-          <a:p>
-            <a:r>
-              <a:rPr lang="en-US" dirty="0" smtClean="0"/>
-              <a:t>Main approaches</a:t>
-            </a:r>
-          </a:p>
-          <a:p>
-            <a:pPr lvl="1"/>
-            <a:r>
-              <a:rPr lang="en-US" dirty="0" smtClean="0"/>
-              <a:t>Epsilon Greedy</a:t>
-            </a:r>
-          </a:p>
-          <a:p>
-            <a:pPr lvl="1"/>
-            <a:r>
-              <a:rPr lang="en-US" dirty="0" smtClean="0"/>
-              <a:t>UCB, UCT</a:t>
-            </a:r>
-          </a:p>
-          <a:p>
-            <a:pPr lvl="1"/>
-            <a:r>
-              <a:rPr lang="en-US" dirty="0" smtClean="0"/>
-              <a:t>Thompson Sampling</a:t>
-            </a:r>
-          </a:p>
-          <a:p>
-            <a:pPr lvl="1"/>
-            <a:r>
-              <a:rPr lang="en-US" dirty="0" smtClean="0"/>
-              <a:t>Contextual Bandit</a:t>
-            </a:r>
-          </a:p>
-          <a:p>
-            <a:r>
-              <a:rPr lang="en-US" dirty="0" smtClean="0"/>
-              <a:t>Applications in Computational Advertising</a:t>
-            </a:r>
-          </a:p>
-          <a:p>
-            <a:r>
-              <a:rPr lang="en-US" dirty="0" smtClean="0"/>
-              <a:t>E&amp;E Thoughts are much more important than E&amp;E methods</a:t>
-            </a:r>
-          </a:p>
-        </p:txBody>
-      </p:sp>
+      <p:pic>
+        <p:nvPicPr>
+          <p:cNvPr id="5" name="Picture 4"/>
+          <p:cNvPicPr>
+            <a:picLocks noChangeAspect="1"/>
+          </p:cNvPicPr>
+          <p:nvPr/>
+        </p:nvPicPr>
+        <p:blipFill>
+          <a:blip r:embed="rId2">
+            <a:extLst>
+              <a:ext uri="{28A0092B-C50C-407E-A947-70E740481C1C}">
+                <a14:useLocalDpi xmlns:a14="http://schemas.microsoft.com/office/drawing/2010/main" val="0"/>
+              </a:ext>
+            </a:extLst>
+          </a:blip>
+          <a:stretch>
+            <a:fillRect/>
+          </a:stretch>
+        </p:blipFill>
+        <p:spPr>
+          <a:xfrm>
+            <a:off x="1879600" y="1690688"/>
+            <a:ext cx="6185998" cy="4874235"/>
+          </a:xfrm>
+          <a:prstGeom prst="rect">
+            <a:avLst/>
+          </a:prstGeom>
+        </p:spPr>
+      </p:pic>
     </p:spTree>
     <p:extLst>
       <p:ext uri="{BB962C8B-B14F-4D97-AF65-F5344CB8AC3E}">
-        <p14:creationId xmlns:p14="http://schemas.microsoft.com/office/powerpoint/2010/main" val="491080361"/>
+        <p14:creationId xmlns:p14="http://schemas.microsoft.com/office/powerpoint/2010/main" val="1046020190"/>
       </p:ext>
     </p:extLst>
   </p:cSld>
@@ -4918,12 +5090,187 @@
             <p:ph type="title"/>
           </p:nvPr>
         </p:nvSpPr>
+        <p:spPr/>
+        <p:txBody>
+          <a:bodyPr/>
+          <a:lstStyle/>
+          <a:p>
+            <a:r>
+              <a:rPr lang="en-US" altLang="zh-CN" dirty="0" smtClean="0"/>
+              <a:t>Main Approaches </a:t>
+            </a:r>
+            <a:r>
+              <a:rPr lang="mr-IN" altLang="zh-CN" dirty="0" smtClean="0"/>
+              <a:t>–</a:t>
+            </a:r>
+            <a:r>
+              <a:rPr lang="en-US" altLang="zh-CN" dirty="0" smtClean="0"/>
+              <a:t> Contextual-Bandit Approach</a:t>
+            </a:r>
+            <a:endParaRPr lang="en-US" dirty="0"/>
+          </a:p>
+        </p:txBody>
+      </p:sp>
+      <p:pic>
+        <p:nvPicPr>
+          <p:cNvPr id="5" name="Picture 4"/>
+          <p:cNvPicPr>
+            <a:picLocks noChangeAspect="1"/>
+          </p:cNvPicPr>
+          <p:nvPr/>
+        </p:nvPicPr>
+        <p:blipFill>
+          <a:blip r:embed="rId2">
+            <a:extLst>
+              <a:ext uri="{28A0092B-C50C-407E-A947-70E740481C1C}">
+                <a14:useLocalDpi xmlns:a14="http://schemas.microsoft.com/office/drawing/2010/main" val="0"/>
+              </a:ext>
+            </a:extLst>
+          </a:blip>
+          <a:stretch>
+            <a:fillRect/>
+          </a:stretch>
+        </p:blipFill>
         <p:spPr>
           <a:xfrm>
-            <a:off x="3862754" y="2592510"/>
-            <a:ext cx="5468815" cy="1325563"/>
+            <a:off x="1879600" y="1690688"/>
+            <a:ext cx="6185998" cy="4874235"/>
           </a:xfrm>
+          <a:prstGeom prst="rect">
+            <a:avLst/>
+          </a:prstGeom>
         </p:spPr>
+      </p:pic>
+    </p:spTree>
+    <p:extLst>
+      <p:ext uri="{BB962C8B-B14F-4D97-AF65-F5344CB8AC3E}">
+        <p14:creationId xmlns:p14="http://schemas.microsoft.com/office/powerpoint/2010/main" val="480762217"/>
+      </p:ext>
+    </p:extLst>
+  </p:cSld>
+  <p:clrMapOvr>
+    <a:masterClrMapping/>
+  </p:clrMapOvr>
+</p:sld>
+</file>
+
+<file path=ppt/slides/slide26.xml><?xml version="1.0" encoding="utf-8"?>
+<p:sld xmlns:a="http://schemas.openxmlformats.org/drawingml/2006/main" xmlns:r="http://schemas.openxmlformats.org/officeDocument/2006/relationships" xmlns:p="http://schemas.openxmlformats.org/presentationml/2006/main">
+  <p:cSld>
+    <p:spTree>
+      <p:nvGrpSpPr>
+        <p:cNvPr id="1" name=""/>
+        <p:cNvGrpSpPr/>
+        <p:nvPr/>
+      </p:nvGrpSpPr>
+      <p:grpSpPr>
+        <a:xfrm>
+          <a:off x="0" y="0"/>
+          <a:ext cx="0" cy="0"/>
+          <a:chOff x="0" y="0"/>
+          <a:chExt cx="0" cy="0"/>
+        </a:xfrm>
+      </p:grpSpPr>
+      <p:sp>
+        <p:nvSpPr>
+          <p:cNvPr id="2" name="Title 1"/>
+          <p:cNvSpPr>
+            <a:spLocks noGrp="1"/>
+          </p:cNvSpPr>
+          <p:nvPr>
+            <p:ph type="title"/>
+          </p:nvPr>
+        </p:nvSpPr>
+        <p:spPr/>
+        <p:txBody>
+          <a:bodyPr/>
+          <a:lstStyle/>
+          <a:p>
+            <a:r>
+              <a:rPr lang="en-US" dirty="0" smtClean="0"/>
+              <a:t>Some recent research</a:t>
+            </a:r>
+            <a:endParaRPr lang="en-US" dirty="0"/>
+          </a:p>
+        </p:txBody>
+      </p:sp>
+      <p:sp>
+        <p:nvSpPr>
+          <p:cNvPr id="3" name="Content Placeholder 2"/>
+          <p:cNvSpPr>
+            <a:spLocks noGrp="1"/>
+          </p:cNvSpPr>
+          <p:nvPr>
+            <p:ph idx="1"/>
+          </p:nvPr>
+        </p:nvSpPr>
+        <p:spPr/>
+        <p:txBody>
+          <a:bodyPr/>
+          <a:lstStyle/>
+          <a:p>
+            <a:r>
+              <a:rPr lang="en-US" dirty="0" smtClean="0"/>
+              <a:t>RL learning</a:t>
+            </a:r>
+          </a:p>
+          <a:p>
+            <a:r>
+              <a:rPr lang="en-US" dirty="0"/>
+              <a:t>theoretical </a:t>
+            </a:r>
+            <a:r>
+              <a:rPr lang="en-US" dirty="0" smtClean="0"/>
+              <a:t>research</a:t>
+            </a:r>
+            <a:endParaRPr lang="zh-CN" altLang="en-US" dirty="0" smtClean="0"/>
+          </a:p>
+          <a:p>
+            <a:endParaRPr lang="zh-CN" altLang="en-US" dirty="0"/>
+          </a:p>
+        </p:txBody>
+      </p:sp>
+    </p:spTree>
+    <p:extLst>
+      <p:ext uri="{BB962C8B-B14F-4D97-AF65-F5344CB8AC3E}">
+        <p14:creationId xmlns:p14="http://schemas.microsoft.com/office/powerpoint/2010/main" val="573288921"/>
+      </p:ext>
+    </p:extLst>
+  </p:cSld>
+  <p:clrMapOvr>
+    <a:masterClrMapping/>
+  </p:clrMapOvr>
+</p:sld>
+</file>
+
+<file path=ppt/slides/slide27.xml><?xml version="1.0" encoding="utf-8"?>
+<p:sld xmlns:a="http://schemas.openxmlformats.org/drawingml/2006/main" xmlns:r="http://schemas.openxmlformats.org/officeDocument/2006/relationships" xmlns:p="http://schemas.openxmlformats.org/presentationml/2006/main">
+  <p:cSld>
+    <p:spTree>
+      <p:nvGrpSpPr>
+        <p:cNvPr id="1" name=""/>
+        <p:cNvGrpSpPr/>
+        <p:nvPr/>
+      </p:nvGrpSpPr>
+      <p:grpSpPr>
+        <a:xfrm>
+          <a:off x="0" y="0"/>
+          <a:ext cx="0" cy="0"/>
+          <a:chOff x="0" y="0"/>
+          <a:chExt cx="0" cy="0"/>
+        </a:xfrm>
+      </p:grpSpPr>
+      <p:sp>
+        <p:nvSpPr>
+          <p:cNvPr id="2" name="Title 1"/>
+          <p:cNvSpPr>
+            <a:spLocks noGrp="1"/>
+          </p:cNvSpPr>
+          <p:nvPr>
+            <p:ph type="title"/>
+          </p:nvPr>
+        </p:nvSpPr>
+        <p:spPr/>
         <p:txBody>
           <a:bodyPr>
             <a:normAutofit/>
@@ -4931,17 +5278,301 @@
           <a:lstStyle/>
           <a:p>
             <a:r>
-              <a:rPr lang="en-US" altLang="zh-CN" sz="8000" smtClean="0"/>
-              <a:t>Thanks</a:t>
-            </a:r>
-            <a:endParaRPr lang="en-US" sz="8000"/>
+              <a:rPr lang="en-US" dirty="0" smtClean="0"/>
+              <a:t>E&amp;E Applications - </a:t>
+            </a:r>
+            <a:r>
+              <a:rPr lang="en-US" dirty="0"/>
+              <a:t>Programmatic </a:t>
+            </a:r>
+            <a:r>
+              <a:rPr lang="en-US" dirty="0" smtClean="0"/>
+              <a:t>Creative Optimization </a:t>
+            </a:r>
+            <a:endParaRPr lang="en-US" dirty="0"/>
+          </a:p>
+        </p:txBody>
+      </p:sp>
+      <p:sp>
+        <p:nvSpPr>
+          <p:cNvPr id="5" name="TextBox 4"/>
+          <p:cNvSpPr txBox="1"/>
+          <p:nvPr/>
+        </p:nvSpPr>
+        <p:spPr>
+          <a:xfrm>
+            <a:off x="1031631" y="2098430"/>
+            <a:ext cx="10322169" cy="923330"/>
+          </a:xfrm>
+          <a:prstGeom prst="rect">
+            <a:avLst/>
+          </a:prstGeom>
+          <a:noFill/>
+        </p:spPr>
+        <p:txBody>
+          <a:bodyPr wrap="square" rtlCol="0">
+            <a:spAutoFit/>
+          </a:bodyPr>
+          <a:lstStyle/>
+          <a:p>
+            <a:r>
+              <a:rPr lang="zh-CN" altLang="en-US" dirty="0" smtClean="0"/>
+              <a:t>做</a:t>
+            </a:r>
+            <a:r>
+              <a:rPr lang="en-US" altLang="zh-CN" dirty="0" smtClean="0"/>
+              <a:t>UBER</a:t>
+            </a:r>
+            <a:r>
+              <a:rPr lang="zh-CN" altLang="en-US" dirty="0" smtClean="0"/>
+              <a:t>司机，月入万元			</a:t>
+            </a:r>
+            <a:r>
+              <a:rPr lang="en-US" altLang="zh-CN" dirty="0" smtClean="0"/>
+              <a:t>CVR=0.1%</a:t>
+            </a:r>
+            <a:endParaRPr lang="zh-CN" altLang="en-US" dirty="0" smtClean="0"/>
+          </a:p>
+          <a:p>
+            <a:endParaRPr lang="zh-CN" altLang="en-US" dirty="0" smtClean="0"/>
+          </a:p>
+          <a:p>
+            <a:r>
+              <a:rPr lang="zh-CN" altLang="en-US" dirty="0" smtClean="0"/>
+              <a:t>在北京做</a:t>
+            </a:r>
+            <a:r>
+              <a:rPr lang="en-US" altLang="zh-CN" dirty="0" smtClean="0"/>
+              <a:t>UBER</a:t>
+            </a:r>
+            <a:r>
+              <a:rPr lang="zh-CN" altLang="en-US" dirty="0" smtClean="0"/>
+              <a:t>司机，月入万元		</a:t>
+            </a:r>
+            <a:r>
+              <a:rPr lang="en-US" altLang="zh-CN" dirty="0" smtClean="0"/>
+              <a:t>CVR</a:t>
+            </a:r>
+            <a:r>
+              <a:rPr lang="zh-CN" altLang="en-US" dirty="0"/>
+              <a:t> </a:t>
+            </a:r>
+            <a:r>
+              <a:rPr lang="en-US" altLang="zh-CN" dirty="0" smtClean="0"/>
+              <a:t>lift</a:t>
+            </a:r>
+            <a:r>
+              <a:rPr lang="zh-CN" altLang="en-US" dirty="0" smtClean="0"/>
+              <a:t> </a:t>
+            </a:r>
+            <a:r>
+              <a:rPr lang="en-US" altLang="zh-CN" dirty="0" smtClean="0"/>
+              <a:t>40%</a:t>
+            </a:r>
+            <a:endParaRPr lang="en-US" dirty="0"/>
           </a:p>
         </p:txBody>
       </p:sp>
     </p:spTree>
     <p:extLst>
       <p:ext uri="{BB962C8B-B14F-4D97-AF65-F5344CB8AC3E}">
-        <p14:creationId xmlns:p14="http://schemas.microsoft.com/office/powerpoint/2010/main" val="996130407"/>
+        <p14:creationId xmlns:p14="http://schemas.microsoft.com/office/powerpoint/2010/main" val="217670522"/>
+      </p:ext>
+    </p:extLst>
+  </p:cSld>
+  <p:clrMapOvr>
+    <a:masterClrMapping/>
+  </p:clrMapOvr>
+</p:sld>
+</file>
+
+<file path=ppt/slides/slide28.xml><?xml version="1.0" encoding="utf-8"?>
+<p:sld xmlns:a="http://schemas.openxmlformats.org/drawingml/2006/main" xmlns:r="http://schemas.openxmlformats.org/officeDocument/2006/relationships" xmlns:p="http://schemas.openxmlformats.org/presentationml/2006/main">
+  <p:cSld>
+    <p:spTree>
+      <p:nvGrpSpPr>
+        <p:cNvPr id="1" name=""/>
+        <p:cNvGrpSpPr/>
+        <p:nvPr/>
+      </p:nvGrpSpPr>
+      <p:grpSpPr>
+        <a:xfrm>
+          <a:off x="0" y="0"/>
+          <a:ext cx="0" cy="0"/>
+          <a:chOff x="0" y="0"/>
+          <a:chExt cx="0" cy="0"/>
+        </a:xfrm>
+      </p:grpSpPr>
+      <p:sp>
+        <p:nvSpPr>
+          <p:cNvPr id="2" name="Title 1"/>
+          <p:cNvSpPr>
+            <a:spLocks noGrp="1"/>
+          </p:cNvSpPr>
+          <p:nvPr>
+            <p:ph type="title"/>
+          </p:nvPr>
+        </p:nvSpPr>
+        <p:spPr/>
+        <p:txBody>
+          <a:bodyPr/>
+          <a:lstStyle/>
+          <a:p>
+            <a:r>
+              <a:rPr lang="en-US" dirty="0" smtClean="0"/>
+              <a:t>E&amp;E Applications </a:t>
+            </a:r>
+            <a:r>
+              <a:rPr lang="mr-IN" dirty="0" smtClean="0"/>
+              <a:t>–</a:t>
+            </a:r>
+            <a:r>
+              <a:rPr lang="zh-CN" altLang="en-US" dirty="0" smtClean="0"/>
+              <a:t> </a:t>
+            </a:r>
+            <a:r>
+              <a:rPr lang="en-US" altLang="zh-CN" dirty="0" smtClean="0"/>
+              <a:t>Auction</a:t>
+            </a:r>
+            <a:r>
+              <a:rPr lang="zh-CN" altLang="en-US" dirty="0" smtClean="0"/>
+              <a:t> </a:t>
+            </a:r>
+            <a:r>
+              <a:rPr lang="en-US" altLang="zh-CN" dirty="0" smtClean="0"/>
+              <a:t>Traffic</a:t>
+            </a:r>
+            <a:r>
+              <a:rPr lang="zh-CN" altLang="en-US" dirty="0" smtClean="0"/>
+              <a:t> </a:t>
+            </a:r>
+            <a:r>
+              <a:rPr lang="en-US" altLang="zh-CN" dirty="0" smtClean="0"/>
+              <a:t>Allocation</a:t>
+            </a:r>
+            <a:endParaRPr lang="en-US" dirty="0"/>
+          </a:p>
+        </p:txBody>
+      </p:sp>
+      <p:sp>
+        <p:nvSpPr>
+          <p:cNvPr id="3" name="Content Placeholder 2"/>
+          <p:cNvSpPr>
+            <a:spLocks noGrp="1"/>
+          </p:cNvSpPr>
+          <p:nvPr>
+            <p:ph idx="1"/>
+          </p:nvPr>
+        </p:nvSpPr>
+        <p:spPr/>
+        <p:txBody>
+          <a:bodyPr/>
+          <a:lstStyle/>
+          <a:p>
+            <a:r>
+              <a:rPr lang="en-US" dirty="0" smtClean="0"/>
+              <a:t>How to allocate traffic with specific tags to SSP?</a:t>
+            </a:r>
+            <a:endParaRPr lang="en-US" dirty="0"/>
+          </a:p>
+        </p:txBody>
+      </p:sp>
+    </p:spTree>
+    <p:extLst>
+      <p:ext uri="{BB962C8B-B14F-4D97-AF65-F5344CB8AC3E}">
+        <p14:creationId xmlns:p14="http://schemas.microsoft.com/office/powerpoint/2010/main" val="1719442406"/>
+      </p:ext>
+    </p:extLst>
+  </p:cSld>
+  <p:clrMapOvr>
+    <a:masterClrMapping/>
+  </p:clrMapOvr>
+</p:sld>
+</file>
+
+<file path=ppt/slides/slide29.xml><?xml version="1.0" encoding="utf-8"?>
+<p:sld xmlns:a="http://schemas.openxmlformats.org/drawingml/2006/main" xmlns:r="http://schemas.openxmlformats.org/officeDocument/2006/relationships" xmlns:p="http://schemas.openxmlformats.org/presentationml/2006/main">
+  <p:cSld>
+    <p:spTree>
+      <p:nvGrpSpPr>
+        <p:cNvPr id="1" name=""/>
+        <p:cNvGrpSpPr/>
+        <p:nvPr/>
+      </p:nvGrpSpPr>
+      <p:grpSpPr>
+        <a:xfrm>
+          <a:off x="0" y="0"/>
+          <a:ext cx="0" cy="0"/>
+          <a:chOff x="0" y="0"/>
+          <a:chExt cx="0" cy="0"/>
+        </a:xfrm>
+      </p:grpSpPr>
+      <p:sp>
+        <p:nvSpPr>
+          <p:cNvPr id="2" name="Title 1"/>
+          <p:cNvSpPr>
+            <a:spLocks noGrp="1"/>
+          </p:cNvSpPr>
+          <p:nvPr>
+            <p:ph type="title"/>
+          </p:nvPr>
+        </p:nvSpPr>
+        <p:spPr/>
+        <p:txBody>
+          <a:bodyPr/>
+          <a:lstStyle/>
+          <a:p>
+            <a:r>
+              <a:rPr lang="en-US" dirty="0" smtClean="0"/>
+              <a:t>E&amp;E Applications </a:t>
+            </a:r>
+            <a:r>
+              <a:rPr lang="mr-IN" dirty="0" smtClean="0"/>
+              <a:t>–</a:t>
+            </a:r>
+            <a:r>
+              <a:rPr lang="zh-CN" altLang="en-US" dirty="0" smtClean="0"/>
+              <a:t> </a:t>
+            </a:r>
+            <a:r>
+              <a:rPr lang="en-US" altLang="zh-CN" dirty="0" smtClean="0"/>
+              <a:t>CVR</a:t>
+            </a:r>
+            <a:r>
+              <a:rPr lang="zh-CN" altLang="en-US" dirty="0" smtClean="0"/>
+              <a:t> </a:t>
+            </a:r>
+            <a:r>
+              <a:rPr lang="en-US" altLang="zh-CN" dirty="0" smtClean="0"/>
+              <a:t>Exploration</a:t>
+            </a:r>
+            <a:endParaRPr lang="en-US" dirty="0"/>
+          </a:p>
+        </p:txBody>
+      </p:sp>
+      <p:sp>
+        <p:nvSpPr>
+          <p:cNvPr id="3" name="Content Placeholder 2"/>
+          <p:cNvSpPr>
+            <a:spLocks noGrp="1"/>
+          </p:cNvSpPr>
+          <p:nvPr>
+            <p:ph idx="1"/>
+          </p:nvPr>
+        </p:nvSpPr>
+        <p:spPr/>
+        <p:txBody>
+          <a:bodyPr/>
+          <a:lstStyle/>
+          <a:p>
+            <a:endParaRPr lang="en-US" dirty="0"/>
+          </a:p>
+        </p:txBody>
+      </p:sp>
+    </p:spTree>
+    <p:extLst>
+      <p:ext uri="{BB962C8B-B14F-4D97-AF65-F5344CB8AC3E}">
+        <p14:creationId xmlns:p14="http://schemas.microsoft.com/office/powerpoint/2010/main" val="400404139"/>
       </p:ext>
     </p:extLst>
   </p:cSld>
@@ -5176,6 +5807,187 @@
     <p:extLst>
       <p:ext uri="{BB962C8B-B14F-4D97-AF65-F5344CB8AC3E}">
         <p14:creationId xmlns:p14="http://schemas.microsoft.com/office/powerpoint/2010/main" val="1277718815"/>
+      </p:ext>
+    </p:extLst>
+  </p:cSld>
+  <p:clrMapOvr>
+    <a:masterClrMapping/>
+  </p:clrMapOvr>
+</p:sld>
+</file>
+
+<file path=ppt/slides/slide30.xml><?xml version="1.0" encoding="utf-8"?>
+<p:sld xmlns:a="http://schemas.openxmlformats.org/drawingml/2006/main" xmlns:r="http://schemas.openxmlformats.org/officeDocument/2006/relationships" xmlns:p="http://schemas.openxmlformats.org/presentationml/2006/main">
+  <p:cSld>
+    <p:spTree>
+      <p:nvGrpSpPr>
+        <p:cNvPr id="1" name=""/>
+        <p:cNvGrpSpPr/>
+        <p:nvPr/>
+      </p:nvGrpSpPr>
+      <p:grpSpPr>
+        <a:xfrm>
+          <a:off x="0" y="0"/>
+          <a:ext cx="0" cy="0"/>
+          <a:chOff x="0" y="0"/>
+          <a:chExt cx="0" cy="0"/>
+        </a:xfrm>
+      </p:grpSpPr>
+      <p:sp>
+        <p:nvSpPr>
+          <p:cNvPr id="2" name="Title 1"/>
+          <p:cNvSpPr>
+            <a:spLocks noGrp="1"/>
+          </p:cNvSpPr>
+          <p:nvPr>
+            <p:ph type="title"/>
+          </p:nvPr>
+        </p:nvSpPr>
+        <p:spPr/>
+        <p:txBody>
+          <a:bodyPr/>
+          <a:lstStyle/>
+          <a:p>
+            <a:r>
+              <a:rPr lang="en-US" altLang="zh-CN" dirty="0" smtClean="0"/>
+              <a:t>Summary</a:t>
+            </a:r>
+            <a:endParaRPr lang="en-US" dirty="0"/>
+          </a:p>
+        </p:txBody>
+      </p:sp>
+      <p:sp>
+        <p:nvSpPr>
+          <p:cNvPr id="3" name="Content Placeholder 2"/>
+          <p:cNvSpPr>
+            <a:spLocks noGrp="1"/>
+          </p:cNvSpPr>
+          <p:nvPr>
+            <p:ph idx="1"/>
+          </p:nvPr>
+        </p:nvSpPr>
+        <p:spPr/>
+        <p:txBody>
+          <a:bodyPr/>
+          <a:lstStyle/>
+          <a:p>
+            <a:r>
+              <a:rPr lang="en-US" dirty="0" smtClean="0"/>
+              <a:t>Exploitation and Exploration Tradeoff</a:t>
+            </a:r>
+          </a:p>
+          <a:p>
+            <a:r>
+              <a:rPr lang="en-US" dirty="0" smtClean="0"/>
+              <a:t>Main approaches</a:t>
+            </a:r>
+          </a:p>
+          <a:p>
+            <a:pPr lvl="1"/>
+            <a:r>
+              <a:rPr lang="en-US" dirty="0" smtClean="0"/>
+              <a:t>Epsilon Greedy</a:t>
+            </a:r>
+          </a:p>
+          <a:p>
+            <a:pPr lvl="1"/>
+            <a:r>
+              <a:rPr lang="en-US" dirty="0" smtClean="0"/>
+              <a:t>UCB, UCT</a:t>
+            </a:r>
+          </a:p>
+          <a:p>
+            <a:pPr lvl="1"/>
+            <a:r>
+              <a:rPr lang="en-US" dirty="0" smtClean="0"/>
+              <a:t>Thompson Sampling</a:t>
+            </a:r>
+          </a:p>
+          <a:p>
+            <a:pPr lvl="1"/>
+            <a:r>
+              <a:rPr lang="en-US" dirty="0" smtClean="0"/>
+              <a:t>Contextual Bandit</a:t>
+            </a:r>
+          </a:p>
+          <a:p>
+            <a:r>
+              <a:rPr lang="en-US" dirty="0" smtClean="0"/>
+              <a:t>Applications in Computational Advertising</a:t>
+            </a:r>
+          </a:p>
+          <a:p>
+            <a:r>
+              <a:rPr lang="en-US" dirty="0" smtClean="0"/>
+              <a:t>E&amp;E Thoughts are much more important than E&amp;E methods</a:t>
+            </a:r>
+          </a:p>
+        </p:txBody>
+      </p:sp>
+    </p:spTree>
+    <p:extLst>
+      <p:ext uri="{BB962C8B-B14F-4D97-AF65-F5344CB8AC3E}">
+        <p14:creationId xmlns:p14="http://schemas.microsoft.com/office/powerpoint/2010/main" val="491080361"/>
+      </p:ext>
+    </p:extLst>
+  </p:cSld>
+  <p:clrMapOvr>
+    <a:masterClrMapping/>
+  </p:clrMapOvr>
+</p:sld>
+</file>
+
+<file path=ppt/slides/slide31.xml><?xml version="1.0" encoding="utf-8"?>
+<p:sld xmlns:a="http://schemas.openxmlformats.org/drawingml/2006/main" xmlns:r="http://schemas.openxmlformats.org/officeDocument/2006/relationships" xmlns:p="http://schemas.openxmlformats.org/presentationml/2006/main">
+  <p:cSld>
+    <p:spTree>
+      <p:nvGrpSpPr>
+        <p:cNvPr id="1" name=""/>
+        <p:cNvGrpSpPr/>
+        <p:nvPr/>
+      </p:nvGrpSpPr>
+      <p:grpSpPr>
+        <a:xfrm>
+          <a:off x="0" y="0"/>
+          <a:ext cx="0" cy="0"/>
+          <a:chOff x="0" y="0"/>
+          <a:chExt cx="0" cy="0"/>
+        </a:xfrm>
+      </p:grpSpPr>
+      <p:sp>
+        <p:nvSpPr>
+          <p:cNvPr id="2" name="Title 1"/>
+          <p:cNvSpPr>
+            <a:spLocks noGrp="1"/>
+          </p:cNvSpPr>
+          <p:nvPr>
+            <p:ph type="title"/>
+          </p:nvPr>
+        </p:nvSpPr>
+        <p:spPr>
+          <a:xfrm>
+            <a:off x="3862754" y="2592510"/>
+            <a:ext cx="5468815" cy="1325563"/>
+          </a:xfrm>
+        </p:spPr>
+        <p:txBody>
+          <a:bodyPr>
+            <a:normAutofit/>
+          </a:bodyPr>
+          <a:lstStyle/>
+          <a:p>
+            <a:r>
+              <a:rPr lang="en-US" altLang="zh-CN" sz="8000" smtClean="0"/>
+              <a:t>Thanks</a:t>
+            </a:r>
+            <a:endParaRPr lang="en-US" sz="8000"/>
+          </a:p>
+        </p:txBody>
+      </p:sp>
+    </p:spTree>
+    <p:extLst>
+      <p:ext uri="{BB962C8B-B14F-4D97-AF65-F5344CB8AC3E}">
+        <p14:creationId xmlns:p14="http://schemas.microsoft.com/office/powerpoint/2010/main" val="996130407"/>
       </p:ext>
     </p:extLst>
   </p:cSld>

</xml_diff>